<commit_message>
correction sep is delimin column splitting
In the examples in the "column splitting" subject, both separate_wider_delim and separate_longer_delim incorrectly give "sep" as an argument in the examples. Corrected now to 'delim'.
</commit_message>
<xml_diff>
--- a/powerpoints/tidyr.pptx
+++ b/powerpoints/tidyr.pptx
@@ -667,7 +667,7 @@
           <a:lstStyle/>
           <a:p>
             <a:fld id="{86CB4B4D-7CA3-9044-876B-883B54F8677D}" type="slidenum">
-              <a:t>‹#›</a:t>
+              <a:t>‹nr.›</a:t>
             </a:fld>
             <a:endParaRPr/>
           </a:p>
@@ -795,7 +795,7 @@
           <a:lstStyle/>
           <a:p>
             <a:fld id="{86CB4B4D-7CA3-9044-876B-883B54F8677D}" type="slidenum">
-              <a:t>‹#›</a:t>
+              <a:t>‹nr.›</a:t>
             </a:fld>
             <a:endParaRPr/>
           </a:p>
@@ -876,7 +876,7 @@
           <a:lstStyle/>
           <a:p>
             <a:fld id="{86CB4B4D-7CA3-9044-876B-883B54F8677D}" type="slidenum">
-              <a:t>‹#›</a:t>
+              <a:t>‹nr.›</a:t>
             </a:fld>
             <a:endParaRPr/>
           </a:p>
@@ -928,7 +928,7 @@
           <a:lstStyle/>
           <a:p>
             <a:fld id="{86CB4B4D-7CA3-9044-876B-883B54F8677D}" type="slidenum">
-              <a:t>‹#›</a:t>
+              <a:t>‹nr.›</a:t>
             </a:fld>
             <a:endParaRPr/>
           </a:p>
@@ -1070,7 +1070,7 @@
           <a:lstStyle/>
           <a:p>
             <a:fld id="{86CB4B4D-7CA3-9044-876B-883B54F8677D}" type="slidenum">
-              <a:t>‹#›</a:t>
+              <a:t>‹nr.›</a:t>
             </a:fld>
             <a:endParaRPr/>
           </a:p>
@@ -1283,7 +1283,7 @@
           <a:lstStyle/>
           <a:p>
             <a:fld id="{86CB4B4D-7CA3-9044-876B-883B54F8677D}" type="slidenum">
-              <a:t>‹#›</a:t>
+              <a:t>‹nr.›</a:t>
             </a:fld>
             <a:endParaRPr/>
           </a:p>
@@ -1364,7 +1364,7 @@
           <a:lstStyle/>
           <a:p>
             <a:fld id="{86CB4B4D-7CA3-9044-876B-883B54F8677D}" type="slidenum">
-              <a:t>‹#›</a:t>
+              <a:t>‹nr.›</a:t>
             </a:fld>
             <a:endParaRPr/>
           </a:p>
@@ -1577,7 +1577,7 @@
           <a:lstStyle/>
           <a:p>
             <a:fld id="{86CB4B4D-7CA3-9044-876B-883B54F8677D}" type="slidenum">
-              <a:t>‹#›</a:t>
+              <a:t>‹nr.›</a:t>
             </a:fld>
             <a:endParaRPr/>
           </a:p>
@@ -1654,7 +1654,7 @@
           <a:lstStyle/>
           <a:p>
             <a:fld id="{86CB4B4D-7CA3-9044-876B-883B54F8677D}" type="slidenum">
-              <a:t>‹#›</a:t>
+              <a:t>‹nr.›</a:t>
             </a:fld>
             <a:endParaRPr/>
           </a:p>
@@ -1780,7 +1780,7 @@
           <a:lstStyle/>
           <a:p>
             <a:fld id="{86CB4B4D-7CA3-9044-876B-883B54F8677D}" type="slidenum">
-              <a:t>‹#›</a:t>
+              <a:t>‹nr.›</a:t>
             </a:fld>
             <a:endParaRPr/>
           </a:p>
@@ -1955,7 +1955,7 @@
           <a:lstStyle/>
           <a:p>
             <a:fld id="{86CB4B4D-7CA3-9044-876B-883B54F8677D}" type="slidenum">
-              <a:t>‹#›</a:t>
+              <a:t>‹nr.›</a:t>
             </a:fld>
             <a:endParaRPr/>
           </a:p>
@@ -2060,7 +2060,7 @@
           <a:lstStyle/>
           <a:p>
             <a:fld id="{86CB4B4D-7CA3-9044-876B-883B54F8677D}" type="slidenum">
-              <a:t>‹#›</a:t>
+              <a:t>‹nr.›</a:t>
             </a:fld>
             <a:endParaRPr/>
           </a:p>
@@ -2199,7 +2199,7 @@
           <a:lstStyle/>
           <a:p>
             <a:fld id="{86CB4B4D-7CA3-9044-876B-883B54F8677D}" type="slidenum">
-              <a:t>‹#›</a:t>
+              <a:t>‹nr.›</a:t>
             </a:fld>
             <a:endParaRPr/>
           </a:p>
@@ -2262,7 +2262,7 @@
           </a:ln>
           <a:extLst>
             <a:ext uri="{C572A759-6A51-4108-AA02-DFA0A04FC94B}">
-              <ma14:wrappingTextBoxFlag xmlns="" xmlns:m="http://schemas.openxmlformats.org/officeDocument/2006/math" xmlns:a14="http://schemas.microsoft.com/office/drawing/2010/main" xmlns:ma14="http://schemas.microsoft.com/office/mac/drawingml/2011/main" val="1"/>
+              <ma14:wrappingTextBoxFlag xmlns:ma14="http://schemas.microsoft.com/office/mac/drawingml/2011/main" xmlns:a14="http://schemas.microsoft.com/office/drawing/2010/main" xmlns:m="http://schemas.openxmlformats.org/officeDocument/2006/math" xmlns="" val="1"/>
             </a:ext>
           </a:extLst>
         </p:spPr>
@@ -2301,7 +2301,7 @@
           </a:ln>
           <a:extLst>
             <a:ext uri="{C572A759-6A51-4108-AA02-DFA0A04FC94B}">
-              <ma14:wrappingTextBoxFlag xmlns="" xmlns:m="http://schemas.openxmlformats.org/officeDocument/2006/math" xmlns:a14="http://schemas.microsoft.com/office/drawing/2010/main" xmlns:ma14="http://schemas.microsoft.com/office/mac/drawingml/2011/main" val="1"/>
+              <ma14:wrappingTextBoxFlag xmlns:ma14="http://schemas.microsoft.com/office/mac/drawingml/2011/main" xmlns:a14="http://schemas.microsoft.com/office/drawing/2010/main" xmlns:m="http://schemas.openxmlformats.org/officeDocument/2006/math" xmlns="" val="1"/>
             </a:ext>
           </a:extLst>
         </p:spPr>
@@ -2385,7 +2385,7 @@
           </a:lstStyle>
           <a:p>
             <a:fld id="{86CB4B4D-7CA3-9044-876B-883B54F8677D}" type="slidenum">
-              <a:t>‹#›</a:t>
+              <a:t>‹nr.›</a:t>
             </a:fld>
             <a:endParaRPr/>
           </a:p>
@@ -4139,7 +4139,7 @@
           </a:ln>
           <a:extLst>
             <a:ext uri="{C572A759-6A51-4108-AA02-DFA0A04FC94B}">
-              <ma14:wrappingTextBoxFlag xmlns="" xmlns:m="http://schemas.openxmlformats.org/officeDocument/2006/math" xmlns:a14="http://schemas.microsoft.com/office/drawing/2010/main" xmlns:ma14="http://schemas.microsoft.com/office/mac/drawingml/2011/main" val="1"/>
+              <ma14:wrappingTextBoxFlag xmlns:ma14="http://schemas.microsoft.com/office/mac/drawingml/2011/main" xmlns:a14="http://schemas.microsoft.com/office/drawing/2010/main" xmlns:m="http://schemas.openxmlformats.org/officeDocument/2006/math" xmlns="" val="1"/>
             </a:ext>
           </a:extLst>
         </p:spPr>
@@ -4185,7 +4185,7 @@
           </a:ln>
           <a:extLst>
             <a:ext uri="{C572A759-6A51-4108-AA02-DFA0A04FC94B}">
-              <ma14:wrappingTextBoxFlag xmlns="" xmlns:m="http://schemas.openxmlformats.org/officeDocument/2006/math" xmlns:a14="http://schemas.microsoft.com/office/drawing/2010/main" xmlns:ma14="http://schemas.microsoft.com/office/mac/drawingml/2011/main" val="1"/>
+              <ma14:wrappingTextBoxFlag xmlns:ma14="http://schemas.microsoft.com/office/mac/drawingml/2011/main" xmlns:a14="http://schemas.microsoft.com/office/drawing/2010/main" xmlns:m="http://schemas.openxmlformats.org/officeDocument/2006/math" xmlns="" val="1"/>
             </a:ext>
           </a:extLst>
         </p:spPr>
@@ -4248,7 +4248,7 @@
           </a:ln>
           <a:extLst>
             <a:ext uri="{C572A759-6A51-4108-AA02-DFA0A04FC94B}">
-              <ma14:wrappingTextBoxFlag xmlns="" xmlns:m="http://schemas.openxmlformats.org/officeDocument/2006/math" xmlns:a14="http://schemas.microsoft.com/office/drawing/2010/main" xmlns:ma14="http://schemas.microsoft.com/office/mac/drawingml/2011/main" val="1"/>
+              <ma14:wrappingTextBoxFlag xmlns:ma14="http://schemas.microsoft.com/office/mac/drawingml/2011/main" xmlns:a14="http://schemas.microsoft.com/office/drawing/2010/main" xmlns:m="http://schemas.openxmlformats.org/officeDocument/2006/math" xmlns="" val="1"/>
             </a:ext>
           </a:extLst>
         </p:spPr>
@@ -4304,7 +4304,7 @@
           </a:ln>
           <a:extLst>
             <a:ext uri="{C572A759-6A51-4108-AA02-DFA0A04FC94B}">
-              <ma14:wrappingTextBoxFlag xmlns="" xmlns:m="http://schemas.openxmlformats.org/officeDocument/2006/math" xmlns:a14="http://schemas.microsoft.com/office/drawing/2010/main" xmlns:ma14="http://schemas.microsoft.com/office/mac/drawingml/2011/main" val="1"/>
+              <ma14:wrappingTextBoxFlag xmlns:ma14="http://schemas.microsoft.com/office/mac/drawingml/2011/main" xmlns:a14="http://schemas.microsoft.com/office/drawing/2010/main" xmlns:m="http://schemas.openxmlformats.org/officeDocument/2006/math" xmlns="" val="1"/>
             </a:ext>
           </a:extLst>
         </p:spPr>
@@ -5790,7 +5790,7 @@
           </a:ln>
           <a:extLst>
             <a:ext uri="{C572A759-6A51-4108-AA02-DFA0A04FC94B}">
-              <ma14:wrappingTextBoxFlag xmlns="" xmlns:m="http://schemas.openxmlformats.org/officeDocument/2006/math" xmlns:a14="http://schemas.microsoft.com/office/drawing/2010/main" xmlns:ma14="http://schemas.microsoft.com/office/mac/drawingml/2011/main" val="1"/>
+              <ma14:wrappingTextBoxFlag xmlns:ma14="http://schemas.microsoft.com/office/mac/drawingml/2011/main" xmlns:a14="http://schemas.microsoft.com/office/drawing/2010/main" xmlns:m="http://schemas.openxmlformats.org/officeDocument/2006/math" xmlns="" val="1"/>
             </a:ext>
           </a:extLst>
         </p:spPr>
@@ -5848,7 +5848,7 @@
           </a:ln>
           <a:extLst>
             <a:ext uri="{C572A759-6A51-4108-AA02-DFA0A04FC94B}">
-              <ma14:wrappingTextBoxFlag xmlns="" xmlns:m="http://schemas.openxmlformats.org/officeDocument/2006/math" xmlns:a14="http://schemas.microsoft.com/office/drawing/2010/main" xmlns:ma14="http://schemas.microsoft.com/office/mac/drawingml/2011/main" val="1"/>
+              <ma14:wrappingTextBoxFlag xmlns:ma14="http://schemas.microsoft.com/office/mac/drawingml/2011/main" xmlns:a14="http://schemas.microsoft.com/office/drawing/2010/main" xmlns:m="http://schemas.openxmlformats.org/officeDocument/2006/math" xmlns="" val="1"/>
             </a:ext>
           </a:extLst>
         </p:spPr>
@@ -5919,7 +5919,7 @@
             <a:effectLst/>
             <a:extLst>
               <a:ext uri="{C572A759-6A51-4108-AA02-DFA0A04FC94B}">
-                <ma14:wrappingTextBoxFlag xmlns="" xmlns:m="http://schemas.openxmlformats.org/officeDocument/2006/math" xmlns:a14="http://schemas.microsoft.com/office/drawing/2010/main" xmlns:ma14="http://schemas.microsoft.com/office/mac/drawingml/2011/main" val="1"/>
+                <ma14:wrappingTextBoxFlag xmlns:ma14="http://schemas.microsoft.com/office/mac/drawingml/2011/main" xmlns:a14="http://schemas.microsoft.com/office/drawing/2010/main" xmlns:m="http://schemas.openxmlformats.org/officeDocument/2006/math" xmlns="" val="1"/>
               </a:ext>
             </a:extLst>
           </p:spPr>
@@ -6714,7 +6714,7 @@
           </a:ln>
           <a:extLst>
             <a:ext uri="{C572A759-6A51-4108-AA02-DFA0A04FC94B}">
-              <ma14:wrappingTextBoxFlag xmlns="" xmlns:m="http://schemas.openxmlformats.org/officeDocument/2006/math" xmlns:a14="http://schemas.microsoft.com/office/drawing/2010/main" xmlns:ma14="http://schemas.microsoft.com/office/mac/drawingml/2011/main" val="1"/>
+              <ma14:wrappingTextBoxFlag xmlns:ma14="http://schemas.microsoft.com/office/mac/drawingml/2011/main" xmlns:a14="http://schemas.microsoft.com/office/drawing/2010/main" xmlns:m="http://schemas.openxmlformats.org/officeDocument/2006/math" xmlns="" val="1"/>
             </a:ext>
           </a:extLst>
         </p:spPr>
@@ -6762,7 +6762,7 @@
           </a:ln>
           <a:extLst>
             <a:ext uri="{C572A759-6A51-4108-AA02-DFA0A04FC94B}">
-              <ma14:wrappingTextBoxFlag xmlns="" xmlns:m="http://schemas.openxmlformats.org/officeDocument/2006/math" xmlns:a14="http://schemas.microsoft.com/office/drawing/2010/main" xmlns:ma14="http://schemas.microsoft.com/office/mac/drawingml/2011/main" val="1"/>
+              <ma14:wrappingTextBoxFlag xmlns:ma14="http://schemas.microsoft.com/office/mac/drawingml/2011/main" xmlns:a14="http://schemas.microsoft.com/office/drawing/2010/main" xmlns:m="http://schemas.openxmlformats.org/officeDocument/2006/math" xmlns="" val="1"/>
             </a:ext>
           </a:extLst>
         </p:spPr>
@@ -6918,7 +6918,7 @@
           </a:ln>
           <a:extLst>
             <a:ext uri="{C572A759-6A51-4108-AA02-DFA0A04FC94B}">
-              <ma14:wrappingTextBoxFlag xmlns="" xmlns:m="http://schemas.openxmlformats.org/officeDocument/2006/math" xmlns:a14="http://schemas.microsoft.com/office/drawing/2010/main" xmlns:ma14="http://schemas.microsoft.com/office/mac/drawingml/2011/main" val="1"/>
+              <ma14:wrappingTextBoxFlag xmlns:ma14="http://schemas.microsoft.com/office/mac/drawingml/2011/main" xmlns:a14="http://schemas.microsoft.com/office/drawing/2010/main" xmlns:m="http://schemas.openxmlformats.org/officeDocument/2006/math" xmlns="" val="1"/>
             </a:ext>
           </a:extLst>
         </p:spPr>
@@ -7147,7 +7147,7 @@
           </a:ln>
           <a:extLst>
             <a:ext uri="{C572A759-6A51-4108-AA02-DFA0A04FC94B}">
-              <ma14:wrappingTextBoxFlag xmlns="" xmlns:m="http://schemas.openxmlformats.org/officeDocument/2006/math" xmlns:a14="http://schemas.microsoft.com/office/drawing/2010/main" xmlns:ma14="http://schemas.microsoft.com/office/mac/drawingml/2011/main" val="1"/>
+              <ma14:wrappingTextBoxFlag xmlns:ma14="http://schemas.microsoft.com/office/mac/drawingml/2011/main" xmlns:a14="http://schemas.microsoft.com/office/drawing/2010/main" xmlns:m="http://schemas.openxmlformats.org/officeDocument/2006/math" xmlns="" val="1"/>
             </a:ext>
           </a:extLst>
         </p:spPr>
@@ -7194,7 +7194,7 @@
           </a:ln>
           <a:extLst>
             <a:ext uri="{C572A759-6A51-4108-AA02-DFA0A04FC94B}">
-              <ma14:wrappingTextBoxFlag xmlns="" xmlns:m="http://schemas.openxmlformats.org/officeDocument/2006/math" xmlns:a14="http://schemas.microsoft.com/office/drawing/2010/main" xmlns:ma14="http://schemas.microsoft.com/office/mac/drawingml/2011/main" val="1"/>
+              <ma14:wrappingTextBoxFlag xmlns:ma14="http://schemas.microsoft.com/office/mac/drawingml/2011/main" xmlns:a14="http://schemas.microsoft.com/office/drawing/2010/main" xmlns:m="http://schemas.openxmlformats.org/officeDocument/2006/math" xmlns="" val="1"/>
             </a:ext>
           </a:extLst>
         </p:spPr>
@@ -7274,7 +7274,7 @@
           </a:ln>
           <a:extLst>
             <a:ext uri="{C572A759-6A51-4108-AA02-DFA0A04FC94B}">
-              <ma14:wrappingTextBoxFlag xmlns="" xmlns:m="http://schemas.openxmlformats.org/officeDocument/2006/math" xmlns:a14="http://schemas.microsoft.com/office/drawing/2010/main" xmlns:ma14="http://schemas.microsoft.com/office/mac/drawingml/2011/main" val="1"/>
+              <ma14:wrappingTextBoxFlag xmlns:ma14="http://schemas.microsoft.com/office/mac/drawingml/2011/main" xmlns:a14="http://schemas.microsoft.com/office/drawing/2010/main" xmlns:m="http://schemas.openxmlformats.org/officeDocument/2006/math" xmlns="" val="1"/>
             </a:ext>
           </a:extLst>
         </p:spPr>
@@ -7396,7 +7396,7 @@
           </a:ln>
           <a:extLst>
             <a:ext uri="{C572A759-6A51-4108-AA02-DFA0A04FC94B}">
-              <ma14:wrappingTextBoxFlag xmlns="" xmlns:m="http://schemas.openxmlformats.org/officeDocument/2006/math" xmlns:a14="http://schemas.microsoft.com/office/drawing/2010/main" xmlns:ma14="http://schemas.microsoft.com/office/mac/drawingml/2011/main" val="1"/>
+              <ma14:wrappingTextBoxFlag xmlns:ma14="http://schemas.microsoft.com/office/mac/drawingml/2011/main" xmlns:a14="http://schemas.microsoft.com/office/drawing/2010/main" xmlns:m="http://schemas.openxmlformats.org/officeDocument/2006/math" xmlns="" val="1"/>
             </a:ext>
           </a:extLst>
         </p:spPr>
@@ -7432,7 +7432,7 @@
           </a:ln>
           <a:extLst>
             <a:ext uri="{C572A759-6A51-4108-AA02-DFA0A04FC94B}">
-              <ma14:wrappingTextBoxFlag xmlns="" xmlns:m="http://schemas.openxmlformats.org/officeDocument/2006/math" xmlns:a14="http://schemas.microsoft.com/office/drawing/2010/main" xmlns:ma14="http://schemas.microsoft.com/office/mac/drawingml/2011/main" val="1"/>
+              <ma14:wrappingTextBoxFlag xmlns:ma14="http://schemas.microsoft.com/office/mac/drawingml/2011/main" xmlns:a14="http://schemas.microsoft.com/office/drawing/2010/main" xmlns:m="http://schemas.openxmlformats.org/officeDocument/2006/math" xmlns="" val="1"/>
             </a:ext>
           </a:extLst>
         </p:spPr>
@@ -7563,7 +7563,7 @@
           </a:ln>
           <a:extLst>
             <a:ext uri="{C572A759-6A51-4108-AA02-DFA0A04FC94B}">
-              <ma14:wrappingTextBoxFlag xmlns="" xmlns:m="http://schemas.openxmlformats.org/officeDocument/2006/math" xmlns:a14="http://schemas.microsoft.com/office/drawing/2010/main" xmlns:ma14="http://schemas.microsoft.com/office/mac/drawingml/2011/main" val="1"/>
+              <ma14:wrappingTextBoxFlag xmlns:ma14="http://schemas.microsoft.com/office/mac/drawingml/2011/main" xmlns:a14="http://schemas.microsoft.com/office/drawing/2010/main" xmlns:m="http://schemas.openxmlformats.org/officeDocument/2006/math" xmlns="" val="1"/>
             </a:ext>
           </a:extLst>
         </p:spPr>
@@ -7681,7 +7681,7 @@
           </a:ln>
           <a:extLst>
             <a:ext uri="{C572A759-6A51-4108-AA02-DFA0A04FC94B}">
-              <ma14:wrappingTextBoxFlag xmlns="" xmlns:m="http://schemas.openxmlformats.org/officeDocument/2006/math" xmlns:a14="http://schemas.microsoft.com/office/drawing/2010/main" xmlns:ma14="http://schemas.microsoft.com/office/mac/drawingml/2011/main" val="1"/>
+              <ma14:wrappingTextBoxFlag xmlns:ma14="http://schemas.microsoft.com/office/mac/drawingml/2011/main" xmlns:a14="http://schemas.microsoft.com/office/drawing/2010/main" xmlns:m="http://schemas.openxmlformats.org/officeDocument/2006/math" xmlns="" val="1"/>
             </a:ext>
           </a:extLst>
         </p:spPr>
@@ -7730,7 +7730,7 @@
           </a:ln>
           <a:extLst>
             <a:ext uri="{C572A759-6A51-4108-AA02-DFA0A04FC94B}">
-              <ma14:wrappingTextBoxFlag xmlns="" xmlns:m="http://schemas.openxmlformats.org/officeDocument/2006/math" xmlns:a14="http://schemas.microsoft.com/office/drawing/2010/main" xmlns:ma14="http://schemas.microsoft.com/office/mac/drawingml/2011/main" val="1"/>
+              <ma14:wrappingTextBoxFlag xmlns:ma14="http://schemas.microsoft.com/office/mac/drawingml/2011/main" xmlns:a14="http://schemas.microsoft.com/office/drawing/2010/main" xmlns:m="http://schemas.openxmlformats.org/officeDocument/2006/math" xmlns="" val="1"/>
             </a:ext>
           </a:extLst>
         </p:spPr>
@@ -7777,7 +7777,7 @@
           </a:ln>
           <a:extLst>
             <a:ext uri="{C572A759-6A51-4108-AA02-DFA0A04FC94B}">
-              <ma14:wrappingTextBoxFlag xmlns="" xmlns:m="http://schemas.openxmlformats.org/officeDocument/2006/math" xmlns:a14="http://schemas.microsoft.com/office/drawing/2010/main" xmlns:ma14="http://schemas.microsoft.com/office/mac/drawingml/2011/main" val="1"/>
+              <ma14:wrappingTextBoxFlag xmlns:ma14="http://schemas.microsoft.com/office/mac/drawingml/2011/main" xmlns:a14="http://schemas.microsoft.com/office/drawing/2010/main" xmlns:m="http://schemas.openxmlformats.org/officeDocument/2006/math" xmlns="" val="1"/>
             </a:ext>
           </a:extLst>
         </p:spPr>
@@ -8478,7 +8478,7 @@
             <a:effectLst/>
             <a:extLst>
               <a:ext uri="{C572A759-6A51-4108-AA02-DFA0A04FC94B}">
-                <ma14:wrappingTextBoxFlag xmlns="" xmlns:m="http://schemas.openxmlformats.org/officeDocument/2006/math" xmlns:a14="http://schemas.microsoft.com/office/drawing/2010/main" xmlns:ma14="http://schemas.microsoft.com/office/mac/drawingml/2011/main" val="1"/>
+                <ma14:wrappingTextBoxFlag xmlns:ma14="http://schemas.microsoft.com/office/mac/drawingml/2011/main" xmlns:a14="http://schemas.microsoft.com/office/drawing/2010/main" xmlns:m="http://schemas.openxmlformats.org/officeDocument/2006/math" xmlns="" val="1"/>
               </a:ext>
             </a:extLst>
           </p:spPr>
@@ -9224,7 +9224,7 @@
             <a:effectLst/>
             <a:extLst>
               <a:ext uri="{C572A759-6A51-4108-AA02-DFA0A04FC94B}">
-                <ma14:wrappingTextBoxFlag xmlns="" xmlns:m="http://schemas.openxmlformats.org/officeDocument/2006/math" xmlns:a14="http://schemas.microsoft.com/office/drawing/2010/main" xmlns:ma14="http://schemas.microsoft.com/office/mac/drawingml/2011/main" val="1"/>
+                <ma14:wrappingTextBoxFlag xmlns:ma14="http://schemas.microsoft.com/office/mac/drawingml/2011/main" xmlns:a14="http://schemas.microsoft.com/office/drawing/2010/main" xmlns:m="http://schemas.openxmlformats.org/officeDocument/2006/math" xmlns="" val="1"/>
               </a:ext>
             </a:extLst>
           </p:spPr>
@@ -10029,7 +10029,7 @@
             <a:effectLst/>
             <a:extLst>
               <a:ext uri="{C572A759-6A51-4108-AA02-DFA0A04FC94B}">
-                <ma14:wrappingTextBoxFlag xmlns="" xmlns:m="http://schemas.openxmlformats.org/officeDocument/2006/math" xmlns:a14="http://schemas.microsoft.com/office/drawing/2010/main" xmlns:ma14="http://schemas.microsoft.com/office/mac/drawingml/2011/main" val="1"/>
+                <ma14:wrappingTextBoxFlag xmlns:ma14="http://schemas.microsoft.com/office/mac/drawingml/2011/main" xmlns:a14="http://schemas.microsoft.com/office/drawing/2010/main" xmlns:m="http://schemas.openxmlformats.org/officeDocument/2006/math" xmlns="" val="1"/>
               </a:ext>
             </a:extLst>
           </p:spPr>
@@ -10135,7 +10135,7 @@
           </a:ln>
           <a:extLst>
             <a:ext uri="{C572A759-6A51-4108-AA02-DFA0A04FC94B}">
-              <ma14:wrappingTextBoxFlag xmlns="" xmlns:m="http://schemas.openxmlformats.org/officeDocument/2006/math" xmlns:a14="http://schemas.microsoft.com/office/drawing/2010/main" xmlns:ma14="http://schemas.microsoft.com/office/mac/drawingml/2011/main" val="1"/>
+              <ma14:wrappingTextBoxFlag xmlns:ma14="http://schemas.microsoft.com/office/mac/drawingml/2011/main" xmlns:a14="http://schemas.microsoft.com/office/drawing/2010/main" xmlns:m="http://schemas.openxmlformats.org/officeDocument/2006/math" xmlns="" val="1"/>
             </a:ext>
           </a:extLst>
         </p:spPr>
@@ -10265,7 +10265,7 @@
           </a:ln>
           <a:extLst>
             <a:ext uri="{C572A759-6A51-4108-AA02-DFA0A04FC94B}">
-              <ma14:wrappingTextBoxFlag xmlns="" xmlns:m="http://schemas.openxmlformats.org/officeDocument/2006/math" xmlns:a14="http://schemas.microsoft.com/office/drawing/2010/main" xmlns:ma14="http://schemas.microsoft.com/office/mac/drawingml/2011/main" val="1"/>
+              <ma14:wrappingTextBoxFlag xmlns:ma14="http://schemas.microsoft.com/office/mac/drawingml/2011/main" xmlns:a14="http://schemas.microsoft.com/office/drawing/2010/main" xmlns:m="http://schemas.openxmlformats.org/officeDocument/2006/math" xmlns="" val="1"/>
             </a:ext>
           </a:extLst>
         </p:spPr>
@@ -10359,7 +10359,7 @@
           </a:ln>
           <a:extLst>
             <a:ext uri="{C572A759-6A51-4108-AA02-DFA0A04FC94B}">
-              <ma14:wrappingTextBoxFlag xmlns="" xmlns:m="http://schemas.openxmlformats.org/officeDocument/2006/math" xmlns:a14="http://schemas.microsoft.com/office/drawing/2010/main" xmlns:ma14="http://schemas.microsoft.com/office/mac/drawingml/2011/main" val="1"/>
+              <ma14:wrappingTextBoxFlag xmlns:ma14="http://schemas.microsoft.com/office/mac/drawingml/2011/main" xmlns:a14="http://schemas.microsoft.com/office/drawing/2010/main" xmlns:m="http://schemas.openxmlformats.org/officeDocument/2006/math" xmlns="" val="1"/>
             </a:ext>
           </a:extLst>
         </p:spPr>
@@ -11060,7 +11060,7 @@
           </a:ln>
           <a:extLst>
             <a:ext uri="{C572A759-6A51-4108-AA02-DFA0A04FC94B}">
-              <ma14:wrappingTextBoxFlag xmlns="" xmlns:m="http://schemas.openxmlformats.org/officeDocument/2006/math" xmlns:a14="http://schemas.microsoft.com/office/drawing/2010/main" xmlns:ma14="http://schemas.microsoft.com/office/mac/drawingml/2011/main" val="1"/>
+              <ma14:wrappingTextBoxFlag xmlns:ma14="http://schemas.microsoft.com/office/mac/drawingml/2011/main" xmlns:a14="http://schemas.microsoft.com/office/drawing/2010/main" xmlns:m="http://schemas.openxmlformats.org/officeDocument/2006/math" xmlns="" val="1"/>
             </a:ext>
           </a:extLst>
         </p:spPr>
@@ -11202,7 +11202,7 @@
           </a:ln>
           <a:extLst>
             <a:ext uri="{C572A759-6A51-4108-AA02-DFA0A04FC94B}">
-              <ma14:wrappingTextBoxFlag xmlns="" xmlns:m="http://schemas.openxmlformats.org/officeDocument/2006/math" xmlns:a14="http://schemas.microsoft.com/office/drawing/2010/main" xmlns:ma14="http://schemas.microsoft.com/office/mac/drawingml/2011/main" val="1"/>
+              <ma14:wrappingTextBoxFlag xmlns:ma14="http://schemas.microsoft.com/office/mac/drawingml/2011/main" xmlns:a14="http://schemas.microsoft.com/office/drawing/2010/main" xmlns:m="http://schemas.openxmlformats.org/officeDocument/2006/math" xmlns="" val="1"/>
             </a:ext>
           </a:extLst>
         </p:spPr>
@@ -11359,7 +11359,7 @@
           </a:ln>
           <a:extLst>
             <a:ext uri="{C572A759-6A51-4108-AA02-DFA0A04FC94B}">
-              <ma14:wrappingTextBoxFlag xmlns="" xmlns:m="http://schemas.openxmlformats.org/officeDocument/2006/math" xmlns:a14="http://schemas.microsoft.com/office/drawing/2010/main" xmlns:ma14="http://schemas.microsoft.com/office/mac/drawingml/2011/main" val="1"/>
+              <ma14:wrappingTextBoxFlag xmlns:ma14="http://schemas.microsoft.com/office/mac/drawingml/2011/main" xmlns:a14="http://schemas.microsoft.com/office/drawing/2010/main" xmlns:m="http://schemas.openxmlformats.org/officeDocument/2006/math" xmlns="" val="1"/>
             </a:ext>
           </a:extLst>
         </p:spPr>
@@ -11504,7 +11504,7 @@
           </a:ln>
           <a:extLst>
             <a:ext uri="{C572A759-6A51-4108-AA02-DFA0A04FC94B}">
-              <ma14:wrappingTextBoxFlag xmlns="" xmlns:m="http://schemas.openxmlformats.org/officeDocument/2006/math" xmlns:a14="http://schemas.microsoft.com/office/drawing/2010/main" xmlns:ma14="http://schemas.microsoft.com/office/mac/drawingml/2011/main" val="1"/>
+              <ma14:wrappingTextBoxFlag xmlns:ma14="http://schemas.microsoft.com/office/mac/drawingml/2011/main" xmlns:a14="http://schemas.microsoft.com/office/drawing/2010/main" xmlns:m="http://schemas.openxmlformats.org/officeDocument/2006/math" xmlns="" val="1"/>
             </a:ext>
           </a:extLst>
         </p:spPr>
@@ -11553,7 +11553,7 @@
           </a:ln>
           <a:extLst>
             <a:ext uri="{C572A759-6A51-4108-AA02-DFA0A04FC94B}">
-              <ma14:wrappingTextBoxFlag xmlns="" xmlns:m="http://schemas.openxmlformats.org/officeDocument/2006/math" xmlns:a14="http://schemas.microsoft.com/office/drawing/2010/main" xmlns:ma14="http://schemas.microsoft.com/office/mac/drawingml/2011/main" val="1"/>
+              <ma14:wrappingTextBoxFlag xmlns:ma14="http://schemas.microsoft.com/office/mac/drawingml/2011/main" xmlns:a14="http://schemas.microsoft.com/office/drawing/2010/main" xmlns:m="http://schemas.openxmlformats.org/officeDocument/2006/math" xmlns="" val="1"/>
             </a:ext>
           </a:extLst>
         </p:spPr>
@@ -11601,7 +11601,7 @@
           </a:ln>
           <a:extLst>
             <a:ext uri="{C572A759-6A51-4108-AA02-DFA0A04FC94B}">
-              <ma14:wrappingTextBoxFlag xmlns="" xmlns:m="http://schemas.openxmlformats.org/officeDocument/2006/math" xmlns:a14="http://schemas.microsoft.com/office/drawing/2010/main" xmlns:ma14="http://schemas.microsoft.com/office/mac/drawingml/2011/main" val="1"/>
+              <ma14:wrappingTextBoxFlag xmlns:ma14="http://schemas.microsoft.com/office/mac/drawingml/2011/main" xmlns:a14="http://schemas.microsoft.com/office/drawing/2010/main" xmlns:m="http://schemas.openxmlformats.org/officeDocument/2006/math" xmlns="" val="1"/>
             </a:ext>
           </a:extLst>
         </p:spPr>
@@ -11805,8 +11805,8 @@
               <a:t>(table3, rate, </a:t>
             </a:r>
             <a:r>
-              <a:rPr b="0" dirty="0" err="1"/>
-              <a:t>sep</a:t>
+              <a:rPr lang="en-US" b="0" dirty="0" err="1"/>
+              <a:t>delim</a:t>
             </a:r>
             <a:r>
               <a:rPr b="0" dirty="0"/>
@@ -11893,8 +11893,8 @@
               <a:t>(table3, rate, </a:t>
             </a:r>
             <a:r>
-              <a:rPr b="0" dirty="0" err="1"/>
-              <a:t>sep</a:t>
+              <a:rPr lang="en-US" b="0" dirty="0" err="1"/>
+              <a:t>delim</a:t>
             </a:r>
             <a:r>
               <a:rPr b="0" dirty="0"/>
@@ -12278,7 +12278,7 @@
           </a:ln>
           <a:extLst>
             <a:ext uri="{C572A759-6A51-4108-AA02-DFA0A04FC94B}">
-              <ma14:wrappingTextBoxFlag xmlns="" xmlns:m="http://schemas.openxmlformats.org/officeDocument/2006/math" xmlns:a14="http://schemas.microsoft.com/office/drawing/2010/main" xmlns:ma14="http://schemas.microsoft.com/office/mac/drawingml/2011/main" val="1"/>
+              <ma14:wrappingTextBoxFlag xmlns:ma14="http://schemas.microsoft.com/office/mac/drawingml/2011/main" xmlns:a14="http://schemas.microsoft.com/office/drawing/2010/main" xmlns:m="http://schemas.openxmlformats.org/officeDocument/2006/math" xmlns="" val="1"/>
             </a:ext>
           </a:extLst>
         </p:spPr>
@@ -12378,7 +12378,7 @@
           </a:ln>
           <a:extLst>
             <a:ext uri="{C572A759-6A51-4108-AA02-DFA0A04FC94B}">
-              <ma14:wrappingTextBoxFlag xmlns="" xmlns:m="http://schemas.openxmlformats.org/officeDocument/2006/math" xmlns:a14="http://schemas.microsoft.com/office/drawing/2010/main" xmlns:ma14="http://schemas.microsoft.com/office/mac/drawingml/2011/main" val="1"/>
+              <ma14:wrappingTextBoxFlag xmlns:ma14="http://schemas.microsoft.com/office/mac/drawingml/2011/main" xmlns:a14="http://schemas.microsoft.com/office/drawing/2010/main" xmlns:m="http://schemas.openxmlformats.org/officeDocument/2006/math" xmlns="" val="1"/>
             </a:ext>
           </a:extLst>
         </p:spPr>
@@ -12424,7 +12424,7 @@
           </a:ln>
           <a:extLst>
             <a:ext uri="{C572A759-6A51-4108-AA02-DFA0A04FC94B}">
-              <ma14:wrappingTextBoxFlag xmlns="" xmlns:m="http://schemas.openxmlformats.org/officeDocument/2006/math" xmlns:a14="http://schemas.microsoft.com/office/drawing/2010/main" xmlns:ma14="http://schemas.microsoft.com/office/mac/drawingml/2011/main" val="1"/>
+              <ma14:wrappingTextBoxFlag xmlns:ma14="http://schemas.microsoft.com/office/mac/drawingml/2011/main" xmlns:a14="http://schemas.microsoft.com/office/drawing/2010/main" xmlns:m="http://schemas.openxmlformats.org/officeDocument/2006/math" xmlns="" val="1"/>
             </a:ext>
           </a:extLst>
         </p:spPr>
@@ -12529,7 +12529,7 @@
             <a:effectLst/>
             <a:extLst>
               <a:ext uri="{C572A759-6A51-4108-AA02-DFA0A04FC94B}">
-                <ma14:wrappingTextBoxFlag xmlns="" xmlns:m="http://schemas.openxmlformats.org/officeDocument/2006/math" xmlns:a14="http://schemas.microsoft.com/office/drawing/2010/main" xmlns:ma14="http://schemas.microsoft.com/office/mac/drawingml/2011/main" val="1"/>
+                <ma14:wrappingTextBoxFlag xmlns:ma14="http://schemas.microsoft.com/office/mac/drawingml/2011/main" xmlns:a14="http://schemas.microsoft.com/office/drawing/2010/main" xmlns:m="http://schemas.openxmlformats.org/officeDocument/2006/math" xmlns="" val="1"/>
               </a:ext>
             </a:extLst>
           </p:spPr>
@@ -14337,7 +14337,7 @@
             <a:effectLst/>
             <a:extLst>
               <a:ext uri="{C572A759-6A51-4108-AA02-DFA0A04FC94B}">
-                <ma14:wrappingTextBoxFlag xmlns="" xmlns:m="http://schemas.openxmlformats.org/officeDocument/2006/math" xmlns:a14="http://schemas.microsoft.com/office/drawing/2010/main" xmlns:ma14="http://schemas.microsoft.com/office/mac/drawingml/2011/main" val="1"/>
+                <ma14:wrappingTextBoxFlag xmlns:ma14="http://schemas.microsoft.com/office/mac/drawingml/2011/main" xmlns:a14="http://schemas.microsoft.com/office/drawing/2010/main" xmlns:m="http://schemas.openxmlformats.org/officeDocument/2006/math" xmlns="" val="1"/>
               </a:ext>
             </a:extLst>
           </p:spPr>
@@ -17062,7 +17062,7 @@
           </a:ln>
           <a:extLst>
             <a:ext uri="{C572A759-6A51-4108-AA02-DFA0A04FC94B}">
-              <ma14:wrappingTextBoxFlag xmlns="" xmlns:m="http://schemas.openxmlformats.org/officeDocument/2006/math" xmlns:a14="http://schemas.microsoft.com/office/drawing/2010/main" xmlns:ma14="http://schemas.microsoft.com/office/mac/drawingml/2011/main" val="1"/>
+              <ma14:wrappingTextBoxFlag xmlns:ma14="http://schemas.microsoft.com/office/mac/drawingml/2011/main" xmlns:a14="http://schemas.microsoft.com/office/drawing/2010/main" xmlns:m="http://schemas.openxmlformats.org/officeDocument/2006/math" xmlns="" val="1"/>
             </a:ext>
           </a:extLst>
         </p:spPr>
@@ -17965,7 +17965,7 @@
             <a:effectLst/>
             <a:extLst>
               <a:ext uri="{C572A759-6A51-4108-AA02-DFA0A04FC94B}">
-                <ma14:wrappingTextBoxFlag xmlns="" xmlns:m="http://schemas.openxmlformats.org/officeDocument/2006/math" xmlns:a14="http://schemas.microsoft.com/office/drawing/2010/main" xmlns:ma14="http://schemas.microsoft.com/office/mac/drawingml/2011/main" val="1"/>
+                <ma14:wrappingTextBoxFlag xmlns:ma14="http://schemas.microsoft.com/office/mac/drawingml/2011/main" xmlns:a14="http://schemas.microsoft.com/office/drawing/2010/main" xmlns:m="http://schemas.openxmlformats.org/officeDocument/2006/math" xmlns="" val="1"/>
               </a:ext>
             </a:extLst>
           </p:spPr>
@@ -19436,7 +19436,7 @@
           </a:ln>
           <a:extLst>
             <a:ext uri="{C572A759-6A51-4108-AA02-DFA0A04FC94B}">
-              <ma14:wrappingTextBoxFlag xmlns="" xmlns:m="http://schemas.openxmlformats.org/officeDocument/2006/math" xmlns:a14="http://schemas.microsoft.com/office/drawing/2010/main" xmlns:ma14="http://schemas.microsoft.com/office/mac/drawingml/2011/main" val="1"/>
+              <ma14:wrappingTextBoxFlag xmlns:ma14="http://schemas.microsoft.com/office/mac/drawingml/2011/main" xmlns:a14="http://schemas.microsoft.com/office/drawing/2010/main" xmlns:m="http://schemas.openxmlformats.org/officeDocument/2006/math" xmlns="" val="1"/>
             </a:ext>
           </a:extLst>
         </p:spPr>
@@ -19860,7 +19860,7 @@
           </a:ln>
           <a:extLst>
             <a:ext uri="{C572A759-6A51-4108-AA02-DFA0A04FC94B}">
-              <ma14:wrappingTextBoxFlag xmlns="" xmlns:m="http://schemas.openxmlformats.org/officeDocument/2006/math" xmlns:a14="http://schemas.microsoft.com/office/drawing/2010/main" xmlns:ma14="http://schemas.microsoft.com/office/mac/drawingml/2011/main" val="1"/>
+              <ma14:wrappingTextBoxFlag xmlns:ma14="http://schemas.microsoft.com/office/mac/drawingml/2011/main" xmlns:a14="http://schemas.microsoft.com/office/drawing/2010/main" xmlns:m="http://schemas.openxmlformats.org/officeDocument/2006/math" xmlns="" val="1"/>
             </a:ext>
           </a:extLst>
         </p:spPr>
@@ -20800,7 +20800,7 @@
           </a:ln>
           <a:extLst>
             <a:ext uri="{C572A759-6A51-4108-AA02-DFA0A04FC94B}">
-              <ma14:wrappingTextBoxFlag xmlns="" xmlns:m="http://schemas.openxmlformats.org/officeDocument/2006/math" xmlns:a14="http://schemas.microsoft.com/office/drawing/2010/main" xmlns:ma14="http://schemas.microsoft.com/office/mac/drawingml/2011/main" val="1"/>
+              <ma14:wrappingTextBoxFlag xmlns:ma14="http://schemas.microsoft.com/office/mac/drawingml/2011/main" xmlns:a14="http://schemas.microsoft.com/office/drawing/2010/main" xmlns:m="http://schemas.openxmlformats.org/officeDocument/2006/math" xmlns="" val="1"/>
             </a:ext>
           </a:extLst>
         </p:spPr>
@@ -20968,7 +20968,7 @@
           </a:ln>
           <a:extLst>
             <a:ext uri="{C572A759-6A51-4108-AA02-DFA0A04FC94B}">
-              <ma14:wrappingTextBoxFlag xmlns="" xmlns:m="http://schemas.openxmlformats.org/officeDocument/2006/math" xmlns:a14="http://schemas.microsoft.com/office/drawing/2010/main" xmlns:ma14="http://schemas.microsoft.com/office/mac/drawingml/2011/main" val="1"/>
+              <ma14:wrappingTextBoxFlag xmlns:ma14="http://schemas.microsoft.com/office/mac/drawingml/2011/main" xmlns:a14="http://schemas.microsoft.com/office/drawing/2010/main" xmlns:m="http://schemas.openxmlformats.org/officeDocument/2006/math" xmlns="" val="1"/>
             </a:ext>
           </a:extLst>
         </p:spPr>
@@ -21106,7 +21106,7 @@
           </a:ln>
           <a:extLst>
             <a:ext uri="{C572A759-6A51-4108-AA02-DFA0A04FC94B}">
-              <ma14:wrappingTextBoxFlag xmlns="" xmlns:m="http://schemas.openxmlformats.org/officeDocument/2006/math" xmlns:a14="http://schemas.microsoft.com/office/drawing/2010/main" xmlns:ma14="http://schemas.microsoft.com/office/mac/drawingml/2011/main" val="1"/>
+              <ma14:wrappingTextBoxFlag xmlns:ma14="http://schemas.microsoft.com/office/mac/drawingml/2011/main" xmlns:a14="http://schemas.microsoft.com/office/drawing/2010/main" xmlns:m="http://schemas.openxmlformats.org/officeDocument/2006/math" xmlns="" val="1"/>
             </a:ext>
           </a:extLst>
         </p:spPr>
@@ -21280,7 +21280,7 @@
           </a:ln>
           <a:extLst>
             <a:ext uri="{C572A759-6A51-4108-AA02-DFA0A04FC94B}">
-              <ma14:wrappingTextBoxFlag xmlns="" xmlns:m="http://schemas.openxmlformats.org/officeDocument/2006/math" xmlns:a14="http://schemas.microsoft.com/office/drawing/2010/main" xmlns:ma14="http://schemas.microsoft.com/office/mac/drawingml/2011/main" val="1"/>
+              <ma14:wrappingTextBoxFlag xmlns:ma14="http://schemas.microsoft.com/office/mac/drawingml/2011/main" xmlns:a14="http://schemas.microsoft.com/office/drawing/2010/main" xmlns:m="http://schemas.openxmlformats.org/officeDocument/2006/math" xmlns="" val="1"/>
             </a:ext>
           </a:extLst>
         </p:spPr>
@@ -21328,7 +21328,7 @@
           </a:ln>
           <a:extLst>
             <a:ext uri="{C572A759-6A51-4108-AA02-DFA0A04FC94B}">
-              <ma14:wrappingTextBoxFlag xmlns="" xmlns:m="http://schemas.openxmlformats.org/officeDocument/2006/math" xmlns:a14="http://schemas.microsoft.com/office/drawing/2010/main" xmlns:ma14="http://schemas.microsoft.com/office/mac/drawingml/2011/main" val="1"/>
+              <ma14:wrappingTextBoxFlag xmlns:ma14="http://schemas.microsoft.com/office/mac/drawingml/2011/main" xmlns:a14="http://schemas.microsoft.com/office/drawing/2010/main" xmlns:m="http://schemas.openxmlformats.org/officeDocument/2006/math" xmlns="" val="1"/>
             </a:ext>
           </a:extLst>
         </p:spPr>
@@ -21381,7 +21381,7 @@
             <a:effectLst/>
             <a:extLst>
               <a:ext uri="{C572A759-6A51-4108-AA02-DFA0A04FC94B}">
-                <ma14:wrappingTextBoxFlag xmlns="" xmlns:m="http://schemas.openxmlformats.org/officeDocument/2006/math" xmlns:a14="http://schemas.microsoft.com/office/drawing/2010/main" xmlns:ma14="http://schemas.microsoft.com/office/mac/drawingml/2011/main" val="1"/>
+                <ma14:wrappingTextBoxFlag xmlns:ma14="http://schemas.microsoft.com/office/mac/drawingml/2011/main" xmlns:a14="http://schemas.microsoft.com/office/drawing/2010/main" xmlns:m="http://schemas.openxmlformats.org/officeDocument/2006/math" xmlns="" val="1"/>
               </a:ext>
             </a:extLst>
           </p:spPr>
@@ -21430,7 +21430,7 @@
             <a:effectLst/>
             <a:extLst>
               <a:ext uri="{C572A759-6A51-4108-AA02-DFA0A04FC94B}">
-                <ma14:wrappingTextBoxFlag xmlns="" xmlns:m="http://schemas.openxmlformats.org/officeDocument/2006/math" xmlns:a14="http://schemas.microsoft.com/office/drawing/2010/main" xmlns:ma14="http://schemas.microsoft.com/office/mac/drawingml/2011/main" val="1"/>
+                <ma14:wrappingTextBoxFlag xmlns:ma14="http://schemas.microsoft.com/office/mac/drawingml/2011/main" xmlns:a14="http://schemas.microsoft.com/office/drawing/2010/main" xmlns:m="http://schemas.openxmlformats.org/officeDocument/2006/math" xmlns="" val="1"/>
               </a:ext>
             </a:extLst>
           </p:spPr>
@@ -26387,7 +26387,7 @@
           </a:ln>
           <a:extLst>
             <a:ext uri="{C572A759-6A51-4108-AA02-DFA0A04FC94B}">
-              <ma14:wrappingTextBoxFlag xmlns="" xmlns:m="http://schemas.openxmlformats.org/officeDocument/2006/math" xmlns:a14="http://schemas.microsoft.com/office/drawing/2010/main" xmlns:ma14="http://schemas.microsoft.com/office/mac/drawingml/2011/main" val="1"/>
+              <ma14:wrappingTextBoxFlag xmlns:ma14="http://schemas.microsoft.com/office/mac/drawingml/2011/main" xmlns:a14="http://schemas.microsoft.com/office/drawing/2010/main" xmlns:m="http://schemas.openxmlformats.org/officeDocument/2006/math" xmlns="" val="1"/>
             </a:ext>
           </a:extLst>
         </p:spPr>
@@ -26435,7 +26435,7 @@
           </a:ln>
           <a:extLst>
             <a:ext uri="{C572A759-6A51-4108-AA02-DFA0A04FC94B}">
-              <ma14:wrappingTextBoxFlag xmlns="" xmlns:m="http://schemas.openxmlformats.org/officeDocument/2006/math" xmlns:a14="http://schemas.microsoft.com/office/drawing/2010/main" xmlns:ma14="http://schemas.microsoft.com/office/mac/drawingml/2011/main" val="1"/>
+              <ma14:wrappingTextBoxFlag xmlns:ma14="http://schemas.microsoft.com/office/mac/drawingml/2011/main" xmlns:a14="http://schemas.microsoft.com/office/drawing/2010/main" xmlns:m="http://schemas.openxmlformats.org/officeDocument/2006/math" xmlns="" val="1"/>
             </a:ext>
           </a:extLst>
         </p:spPr>
@@ -26471,7 +26471,7 @@
           </a:ln>
           <a:extLst>
             <a:ext uri="{C572A759-6A51-4108-AA02-DFA0A04FC94B}">
-              <ma14:wrappingTextBoxFlag xmlns="" xmlns:m="http://schemas.openxmlformats.org/officeDocument/2006/math" xmlns:a14="http://schemas.microsoft.com/office/drawing/2010/main" xmlns:ma14="http://schemas.microsoft.com/office/mac/drawingml/2011/main" val="1"/>
+              <ma14:wrappingTextBoxFlag xmlns:ma14="http://schemas.microsoft.com/office/mac/drawingml/2011/main" xmlns:a14="http://schemas.microsoft.com/office/drawing/2010/main" xmlns:m="http://schemas.openxmlformats.org/officeDocument/2006/math" xmlns="" val="1"/>
             </a:ext>
           </a:extLst>
         </p:spPr>
@@ -26928,7 +26928,7 @@
           </a:ln>
           <a:extLst>
             <a:ext uri="{C572A759-6A51-4108-AA02-DFA0A04FC94B}">
-              <ma14:wrappingTextBoxFlag xmlns="" xmlns:m="http://schemas.openxmlformats.org/officeDocument/2006/math" xmlns:a14="http://schemas.microsoft.com/office/drawing/2010/main" xmlns:ma14="http://schemas.microsoft.com/office/mac/drawingml/2011/main" val="1"/>
+              <ma14:wrappingTextBoxFlag xmlns:ma14="http://schemas.microsoft.com/office/mac/drawingml/2011/main" xmlns:a14="http://schemas.microsoft.com/office/drawing/2010/main" xmlns:m="http://schemas.openxmlformats.org/officeDocument/2006/math" xmlns="" val="1"/>
             </a:ext>
           </a:extLst>
         </p:spPr>
@@ -26984,7 +26984,7 @@
           </a:ln>
           <a:extLst>
             <a:ext uri="{C572A759-6A51-4108-AA02-DFA0A04FC94B}">
-              <ma14:wrappingTextBoxFlag xmlns="" xmlns:m="http://schemas.openxmlformats.org/officeDocument/2006/math" xmlns:a14="http://schemas.microsoft.com/office/drawing/2010/main" xmlns:ma14="http://schemas.microsoft.com/office/mac/drawingml/2011/main" val="1"/>
+              <ma14:wrappingTextBoxFlag xmlns:ma14="http://schemas.microsoft.com/office/mac/drawingml/2011/main" xmlns:a14="http://schemas.microsoft.com/office/drawing/2010/main" xmlns:m="http://schemas.openxmlformats.org/officeDocument/2006/math" xmlns="" val="1"/>
             </a:ext>
           </a:extLst>
         </p:spPr>
@@ -27040,7 +27040,7 @@
           </a:ln>
           <a:extLst>
             <a:ext uri="{C572A759-6A51-4108-AA02-DFA0A04FC94B}">
-              <ma14:wrappingTextBoxFlag xmlns="" xmlns:m="http://schemas.openxmlformats.org/officeDocument/2006/math" xmlns:a14="http://schemas.microsoft.com/office/drawing/2010/main" xmlns:ma14="http://schemas.microsoft.com/office/mac/drawingml/2011/main" val="1"/>
+              <ma14:wrappingTextBoxFlag xmlns:ma14="http://schemas.microsoft.com/office/mac/drawingml/2011/main" xmlns:a14="http://schemas.microsoft.com/office/drawing/2010/main" xmlns:m="http://schemas.openxmlformats.org/officeDocument/2006/math" xmlns="" val="1"/>
             </a:ext>
           </a:extLst>
         </p:spPr>
@@ -27096,7 +27096,7 @@
           </a:ln>
           <a:extLst>
             <a:ext uri="{C572A759-6A51-4108-AA02-DFA0A04FC94B}">
-              <ma14:wrappingTextBoxFlag xmlns="" xmlns:m="http://schemas.openxmlformats.org/officeDocument/2006/math" xmlns:a14="http://schemas.microsoft.com/office/drawing/2010/main" xmlns:ma14="http://schemas.microsoft.com/office/mac/drawingml/2011/main" val="1"/>
+              <ma14:wrappingTextBoxFlag xmlns:ma14="http://schemas.microsoft.com/office/mac/drawingml/2011/main" xmlns:a14="http://schemas.microsoft.com/office/drawing/2010/main" xmlns:m="http://schemas.openxmlformats.org/officeDocument/2006/math" xmlns="" val="1"/>
             </a:ext>
           </a:extLst>
         </p:spPr>
@@ -27148,7 +27148,7 @@
           </a:ln>
           <a:extLst>
             <a:ext uri="{C572A759-6A51-4108-AA02-DFA0A04FC94B}">
-              <ma14:wrappingTextBoxFlag xmlns="" xmlns:m="http://schemas.openxmlformats.org/officeDocument/2006/math" xmlns:a14="http://schemas.microsoft.com/office/drawing/2010/main" xmlns:ma14="http://schemas.microsoft.com/office/mac/drawingml/2011/main" val="1"/>
+              <ma14:wrappingTextBoxFlag xmlns:ma14="http://schemas.microsoft.com/office/mac/drawingml/2011/main" xmlns:a14="http://schemas.microsoft.com/office/drawing/2010/main" xmlns:m="http://schemas.openxmlformats.org/officeDocument/2006/math" xmlns="" val="1"/>
             </a:ext>
           </a:extLst>
         </p:spPr>
@@ -27200,7 +27200,7 @@
           </a:ln>
           <a:extLst>
             <a:ext uri="{C572A759-6A51-4108-AA02-DFA0A04FC94B}">
-              <ma14:wrappingTextBoxFlag xmlns="" xmlns:m="http://schemas.openxmlformats.org/officeDocument/2006/math" xmlns:a14="http://schemas.microsoft.com/office/drawing/2010/main" xmlns:ma14="http://schemas.microsoft.com/office/mac/drawingml/2011/main" val="1"/>
+              <ma14:wrappingTextBoxFlag xmlns:ma14="http://schemas.microsoft.com/office/mac/drawingml/2011/main" xmlns:a14="http://schemas.microsoft.com/office/drawing/2010/main" xmlns:m="http://schemas.openxmlformats.org/officeDocument/2006/math" xmlns="" val="1"/>
             </a:ext>
           </a:extLst>
         </p:spPr>
@@ -27259,7 +27259,7 @@
           </a:ln>
           <a:extLst>
             <a:ext uri="{C572A759-6A51-4108-AA02-DFA0A04FC94B}">
-              <ma14:wrappingTextBoxFlag xmlns="" xmlns:m="http://schemas.openxmlformats.org/officeDocument/2006/math" xmlns:a14="http://schemas.microsoft.com/office/drawing/2010/main" xmlns:ma14="http://schemas.microsoft.com/office/mac/drawingml/2011/main" val="1"/>
+              <ma14:wrappingTextBoxFlag xmlns:ma14="http://schemas.microsoft.com/office/mac/drawingml/2011/main" xmlns:a14="http://schemas.microsoft.com/office/drawing/2010/main" xmlns:m="http://schemas.openxmlformats.org/officeDocument/2006/math" xmlns="" val="1"/>
             </a:ext>
           </a:extLst>
         </p:spPr>
@@ -27556,7 +27556,7 @@
               <a:effectLst/>
               <a:extLst>
                 <a:ext uri="{C572A759-6A51-4108-AA02-DFA0A04FC94B}">
-                  <ma14:wrappingTextBoxFlag xmlns="" xmlns:m="http://schemas.openxmlformats.org/officeDocument/2006/math" xmlns:a14="http://schemas.microsoft.com/office/drawing/2010/main" xmlns:ma14="http://schemas.microsoft.com/office/mac/drawingml/2011/main" val="1"/>
+                  <ma14:wrappingTextBoxFlag xmlns:ma14="http://schemas.microsoft.com/office/mac/drawingml/2011/main" xmlns:a14="http://schemas.microsoft.com/office/drawing/2010/main" xmlns:m="http://schemas.openxmlformats.org/officeDocument/2006/math" xmlns="" val="1"/>
                 </a:ext>
               </a:extLst>
             </p:spPr>
@@ -28484,7 +28484,7 @@
           </a:ln>
           <a:extLst>
             <a:ext uri="{C572A759-6A51-4108-AA02-DFA0A04FC94B}">
-              <ma14:wrappingTextBoxFlag xmlns="" xmlns:m="http://schemas.openxmlformats.org/officeDocument/2006/math" xmlns:a14="http://schemas.microsoft.com/office/drawing/2010/main" xmlns:ma14="http://schemas.microsoft.com/office/mac/drawingml/2011/main" val="1"/>
+              <ma14:wrappingTextBoxFlag xmlns:ma14="http://schemas.microsoft.com/office/mac/drawingml/2011/main" xmlns:a14="http://schemas.microsoft.com/office/drawing/2010/main" xmlns:m="http://schemas.openxmlformats.org/officeDocument/2006/math" xmlns="" val="1"/>
             </a:ext>
           </a:extLst>
         </p:spPr>
@@ -28534,7 +28534,7 @@
           </a:ln>
           <a:extLst>
             <a:ext uri="{C572A759-6A51-4108-AA02-DFA0A04FC94B}">
-              <ma14:wrappingTextBoxFlag xmlns="" xmlns:m="http://schemas.openxmlformats.org/officeDocument/2006/math" xmlns:a14="http://schemas.microsoft.com/office/drawing/2010/main" xmlns:ma14="http://schemas.microsoft.com/office/mac/drawingml/2011/main" val="1"/>
+              <ma14:wrappingTextBoxFlag xmlns:ma14="http://schemas.microsoft.com/office/mac/drawingml/2011/main" xmlns:a14="http://schemas.microsoft.com/office/drawing/2010/main" xmlns:m="http://schemas.openxmlformats.org/officeDocument/2006/math" xmlns="" val="1"/>
             </a:ext>
           </a:extLst>
         </p:spPr>
@@ -28570,7 +28570,7 @@
           </a:ln>
           <a:extLst>
             <a:ext uri="{C572A759-6A51-4108-AA02-DFA0A04FC94B}">
-              <ma14:wrappingTextBoxFlag xmlns="" xmlns:m="http://schemas.openxmlformats.org/officeDocument/2006/math" xmlns:a14="http://schemas.microsoft.com/office/drawing/2010/main" xmlns:ma14="http://schemas.microsoft.com/office/mac/drawingml/2011/main" val="1"/>
+              <ma14:wrappingTextBoxFlag xmlns:ma14="http://schemas.microsoft.com/office/mac/drawingml/2011/main" xmlns:a14="http://schemas.microsoft.com/office/drawing/2010/main" xmlns:m="http://schemas.openxmlformats.org/officeDocument/2006/math" xmlns="" val="1"/>
             </a:ext>
           </a:extLst>
         </p:spPr>
@@ -28672,7 +28672,7 @@
           </a:ln>
           <a:extLst>
             <a:ext uri="{C572A759-6A51-4108-AA02-DFA0A04FC94B}">
-              <ma14:wrappingTextBoxFlag xmlns="" xmlns:m="http://schemas.openxmlformats.org/officeDocument/2006/math" xmlns:a14="http://schemas.microsoft.com/office/drawing/2010/main" xmlns:ma14="http://schemas.microsoft.com/office/mac/drawingml/2011/main" val="1"/>
+              <ma14:wrappingTextBoxFlag xmlns:ma14="http://schemas.microsoft.com/office/mac/drawingml/2011/main" xmlns:a14="http://schemas.microsoft.com/office/drawing/2010/main" xmlns:m="http://schemas.openxmlformats.org/officeDocument/2006/math" xmlns="" val="1"/>
             </a:ext>
           </a:extLst>
         </p:spPr>
@@ -28708,7 +28708,7 @@
           </a:ln>
           <a:extLst>
             <a:ext uri="{C572A759-6A51-4108-AA02-DFA0A04FC94B}">
-              <ma14:wrappingTextBoxFlag xmlns="" xmlns:m="http://schemas.openxmlformats.org/officeDocument/2006/math" xmlns:a14="http://schemas.microsoft.com/office/drawing/2010/main" xmlns:ma14="http://schemas.microsoft.com/office/mac/drawingml/2011/main" val="1"/>
+              <ma14:wrappingTextBoxFlag xmlns:ma14="http://schemas.microsoft.com/office/mac/drawingml/2011/main" xmlns:a14="http://schemas.microsoft.com/office/drawing/2010/main" xmlns:m="http://schemas.openxmlformats.org/officeDocument/2006/math" xmlns="" val="1"/>
             </a:ext>
           </a:extLst>
         </p:spPr>
@@ -28954,7 +28954,7 @@
           </a:ln>
           <a:extLst>
             <a:ext uri="{C572A759-6A51-4108-AA02-DFA0A04FC94B}">
-              <ma14:wrappingTextBoxFlag xmlns="" xmlns:m="http://schemas.openxmlformats.org/officeDocument/2006/math" xmlns:a14="http://schemas.microsoft.com/office/drawing/2010/main" xmlns:ma14="http://schemas.microsoft.com/office/mac/drawingml/2011/main" val="1"/>
+              <ma14:wrappingTextBoxFlag xmlns:ma14="http://schemas.microsoft.com/office/mac/drawingml/2011/main" xmlns:a14="http://schemas.microsoft.com/office/drawing/2010/main" xmlns:m="http://schemas.openxmlformats.org/officeDocument/2006/math" xmlns="" val="1"/>
             </a:ext>
           </a:extLst>
         </p:spPr>
@@ -29004,7 +29004,7 @@
           </a:ln>
           <a:extLst>
             <a:ext uri="{C572A759-6A51-4108-AA02-DFA0A04FC94B}">
-              <ma14:wrappingTextBoxFlag xmlns="" xmlns:m="http://schemas.openxmlformats.org/officeDocument/2006/math" xmlns:a14="http://schemas.microsoft.com/office/drawing/2010/main" xmlns:ma14="http://schemas.microsoft.com/office/mac/drawingml/2011/main" val="1"/>
+              <ma14:wrappingTextBoxFlag xmlns:ma14="http://schemas.microsoft.com/office/mac/drawingml/2011/main" xmlns:a14="http://schemas.microsoft.com/office/drawing/2010/main" xmlns:m="http://schemas.openxmlformats.org/officeDocument/2006/math" xmlns="" val="1"/>
             </a:ext>
           </a:extLst>
         </p:spPr>
@@ -29107,7 +29107,7 @@
           </a:ln>
           <a:extLst>
             <a:ext uri="{C572A759-6A51-4108-AA02-DFA0A04FC94B}">
-              <ma14:wrappingTextBoxFlag xmlns="" xmlns:m="http://schemas.openxmlformats.org/officeDocument/2006/math" xmlns:a14="http://schemas.microsoft.com/office/drawing/2010/main" xmlns:ma14="http://schemas.microsoft.com/office/mac/drawingml/2011/main" val="1"/>
+              <ma14:wrappingTextBoxFlag xmlns:ma14="http://schemas.microsoft.com/office/mac/drawingml/2011/main" xmlns:a14="http://schemas.microsoft.com/office/drawing/2010/main" xmlns:m="http://schemas.openxmlformats.org/officeDocument/2006/math" xmlns="" val="1"/>
             </a:ext>
           </a:extLst>
         </p:spPr>
@@ -30011,7 +30011,7 @@
           </a:ln>
           <a:extLst>
             <a:ext uri="{C572A759-6A51-4108-AA02-DFA0A04FC94B}">
-              <ma14:wrappingTextBoxFlag xmlns="" xmlns:m="http://schemas.openxmlformats.org/officeDocument/2006/math" xmlns:a14="http://schemas.microsoft.com/office/drawing/2010/main" xmlns:ma14="http://schemas.microsoft.com/office/mac/drawingml/2011/main" val="1"/>
+              <ma14:wrappingTextBoxFlag xmlns:ma14="http://schemas.microsoft.com/office/mac/drawingml/2011/main" xmlns:a14="http://schemas.microsoft.com/office/drawing/2010/main" xmlns:m="http://schemas.openxmlformats.org/officeDocument/2006/math" xmlns="" val="1"/>
             </a:ext>
           </a:extLst>
         </p:spPr>
@@ -30114,7 +30114,7 @@
           </a:ln>
           <a:extLst>
             <a:ext uri="{C572A759-6A51-4108-AA02-DFA0A04FC94B}">
-              <ma14:wrappingTextBoxFlag xmlns="" xmlns:m="http://schemas.openxmlformats.org/officeDocument/2006/math" xmlns:a14="http://schemas.microsoft.com/office/drawing/2010/main" xmlns:ma14="http://schemas.microsoft.com/office/mac/drawingml/2011/main" val="1"/>
+              <ma14:wrappingTextBoxFlag xmlns:ma14="http://schemas.microsoft.com/office/mac/drawingml/2011/main" xmlns:a14="http://schemas.microsoft.com/office/drawing/2010/main" xmlns:m="http://schemas.openxmlformats.org/officeDocument/2006/math" xmlns="" val="1"/>
             </a:ext>
           </a:extLst>
         </p:spPr>
@@ -31742,7 +31742,7 @@
           </a:ln>
           <a:extLst>
             <a:ext uri="{C572A759-6A51-4108-AA02-DFA0A04FC94B}">
-              <ma14:wrappingTextBoxFlag xmlns="" xmlns:m="http://schemas.openxmlformats.org/officeDocument/2006/math" xmlns:a14="http://schemas.microsoft.com/office/drawing/2010/main" xmlns:ma14="http://schemas.microsoft.com/office/mac/drawingml/2011/main" val="1"/>
+              <ma14:wrappingTextBoxFlag xmlns:ma14="http://schemas.microsoft.com/office/mac/drawingml/2011/main" xmlns:a14="http://schemas.microsoft.com/office/drawing/2010/main" xmlns:m="http://schemas.openxmlformats.org/officeDocument/2006/math" xmlns="" val="1"/>
             </a:ext>
           </a:extLst>
         </p:spPr>
@@ -31805,7 +31805,7 @@
           </a:ln>
           <a:extLst>
             <a:ext uri="{C572A759-6A51-4108-AA02-DFA0A04FC94B}">
-              <ma14:wrappingTextBoxFlag xmlns="" xmlns:m="http://schemas.openxmlformats.org/officeDocument/2006/math" xmlns:a14="http://schemas.microsoft.com/office/drawing/2010/main" xmlns:ma14="http://schemas.microsoft.com/office/mac/drawingml/2011/main" val="1"/>
+              <ma14:wrappingTextBoxFlag xmlns:ma14="http://schemas.microsoft.com/office/mac/drawingml/2011/main" xmlns:a14="http://schemas.microsoft.com/office/drawing/2010/main" xmlns:m="http://schemas.openxmlformats.org/officeDocument/2006/math" xmlns="" val="1"/>
             </a:ext>
           </a:extLst>
         </p:spPr>
@@ -31861,7 +31861,7 @@
           </a:ln>
           <a:extLst>
             <a:ext uri="{C572A759-6A51-4108-AA02-DFA0A04FC94B}">
-              <ma14:wrappingTextBoxFlag xmlns="" xmlns:m="http://schemas.openxmlformats.org/officeDocument/2006/math" xmlns:a14="http://schemas.microsoft.com/office/drawing/2010/main" xmlns:ma14="http://schemas.microsoft.com/office/mac/drawingml/2011/main" val="1"/>
+              <ma14:wrappingTextBoxFlag xmlns:ma14="http://schemas.microsoft.com/office/mac/drawingml/2011/main" xmlns:a14="http://schemas.microsoft.com/office/drawing/2010/main" xmlns:m="http://schemas.openxmlformats.org/officeDocument/2006/math" xmlns="" val="1"/>
             </a:ext>
           </a:extLst>
         </p:spPr>
@@ -31917,7 +31917,7 @@
           </a:ln>
           <a:extLst>
             <a:ext uri="{C572A759-6A51-4108-AA02-DFA0A04FC94B}">
-              <ma14:wrappingTextBoxFlag xmlns="" xmlns:m="http://schemas.openxmlformats.org/officeDocument/2006/math" xmlns:a14="http://schemas.microsoft.com/office/drawing/2010/main" xmlns:ma14="http://schemas.microsoft.com/office/mac/drawingml/2011/main" val="1"/>
+              <ma14:wrappingTextBoxFlag xmlns:ma14="http://schemas.microsoft.com/office/mac/drawingml/2011/main" xmlns:a14="http://schemas.microsoft.com/office/drawing/2010/main" xmlns:m="http://schemas.openxmlformats.org/officeDocument/2006/math" xmlns="" val="1"/>
             </a:ext>
           </a:extLst>
         </p:spPr>
@@ -31973,7 +31973,7 @@
           </a:ln>
           <a:extLst>
             <a:ext uri="{C572A759-6A51-4108-AA02-DFA0A04FC94B}">
-              <ma14:wrappingTextBoxFlag xmlns="" xmlns:m="http://schemas.openxmlformats.org/officeDocument/2006/math" xmlns:a14="http://schemas.microsoft.com/office/drawing/2010/main" xmlns:ma14="http://schemas.microsoft.com/office/mac/drawingml/2011/main" val="1"/>
+              <ma14:wrappingTextBoxFlag xmlns:ma14="http://schemas.microsoft.com/office/mac/drawingml/2011/main" xmlns:a14="http://schemas.microsoft.com/office/drawing/2010/main" xmlns:m="http://schemas.openxmlformats.org/officeDocument/2006/math" xmlns="" val="1"/>
             </a:ext>
           </a:extLst>
         </p:spPr>
@@ -32085,7 +32085,7 @@
           </a:ln>
           <a:extLst>
             <a:ext uri="{C572A759-6A51-4108-AA02-DFA0A04FC94B}">
-              <ma14:wrappingTextBoxFlag xmlns="" xmlns:m="http://schemas.openxmlformats.org/officeDocument/2006/math" xmlns:a14="http://schemas.microsoft.com/office/drawing/2010/main" xmlns:ma14="http://schemas.microsoft.com/office/mac/drawingml/2011/main" val="1"/>
+              <ma14:wrappingTextBoxFlag xmlns:ma14="http://schemas.microsoft.com/office/mac/drawingml/2011/main" xmlns:a14="http://schemas.microsoft.com/office/drawing/2010/main" xmlns:m="http://schemas.openxmlformats.org/officeDocument/2006/math" xmlns="" val="1"/>
             </a:ext>
           </a:extLst>
         </p:spPr>
@@ -32341,7 +32341,7 @@
           </a:ln>
           <a:extLst>
             <a:ext uri="{C572A759-6A51-4108-AA02-DFA0A04FC94B}">
-              <ma14:wrappingTextBoxFlag xmlns="" xmlns:m="http://schemas.openxmlformats.org/officeDocument/2006/math" xmlns:a14="http://schemas.microsoft.com/office/drawing/2010/main" xmlns:ma14="http://schemas.microsoft.com/office/mac/drawingml/2011/main" val="1"/>
+              <ma14:wrappingTextBoxFlag xmlns:ma14="http://schemas.microsoft.com/office/mac/drawingml/2011/main" xmlns:a14="http://schemas.microsoft.com/office/drawing/2010/main" xmlns:m="http://schemas.openxmlformats.org/officeDocument/2006/math" xmlns="" val="1"/>
             </a:ext>
           </a:extLst>
         </p:spPr>
@@ -32524,7 +32524,7 @@
           </a:ln>
           <a:extLst>
             <a:ext uri="{C572A759-6A51-4108-AA02-DFA0A04FC94B}">
-              <ma14:wrappingTextBoxFlag xmlns="" xmlns:m="http://schemas.openxmlformats.org/officeDocument/2006/math" xmlns:a14="http://schemas.microsoft.com/office/drawing/2010/main" xmlns:ma14="http://schemas.microsoft.com/office/mac/drawingml/2011/main" val="1"/>
+              <ma14:wrappingTextBoxFlag xmlns:ma14="http://schemas.microsoft.com/office/mac/drawingml/2011/main" xmlns:a14="http://schemas.microsoft.com/office/drawing/2010/main" xmlns:m="http://schemas.openxmlformats.org/officeDocument/2006/math" xmlns="" val="1"/>
             </a:ext>
           </a:extLst>
         </p:spPr>

</xml_diff>